<commit_message>
edit AE pic in poster
</commit_message>
<xml_diff>
--- a/poster/Footprint.pptx
+++ b/poster/Footprint.pptx
@@ -4257,14 +4257,14 @@
           </a:ln>
           <a:extLst>
             <a:ext uri="{909E8E84-426E-40dd-AFC4-6F175D3DCCD1}">
-              <a14:hiddenFill xmlns="" xmlns:a14="http://schemas.microsoft.com/office/drawing/2010/main">
+              <a14:hiddenFill xmlns:a14="http://schemas.microsoft.com/office/drawing/2010/main" xmlns="">
                 <a:solidFill>
                   <a:srgbClr val="FFFFFF"/>
                 </a:solidFill>
               </a14:hiddenFill>
             </a:ext>
             <a:ext uri="{91240B29-F687-4f45-9708-019B960494DF}">
-              <a14:hiddenLine xmlns="" xmlns:a14="http://schemas.microsoft.com/office/drawing/2010/main" w="9525">
+              <a14:hiddenLine xmlns:a14="http://schemas.microsoft.com/office/drawing/2010/main" xmlns="" w="9525">
                 <a:solidFill>
                   <a:srgbClr val="000000"/>
                 </a:solidFill>
@@ -4418,14 +4418,14 @@
           </a:ln>
           <a:extLst>
             <a:ext uri="{909E8E84-426E-40dd-AFC4-6F175D3DCCD1}">
-              <a14:hiddenFill xmlns="" xmlns:a14="http://schemas.microsoft.com/office/drawing/2010/main">
+              <a14:hiddenFill xmlns:a14="http://schemas.microsoft.com/office/drawing/2010/main" xmlns="">
                 <a:solidFill>
                   <a:srgbClr val="FFFFFF"/>
                 </a:solidFill>
               </a14:hiddenFill>
             </a:ext>
             <a:ext uri="{91240B29-F687-4f45-9708-019B960494DF}">
-              <a14:hiddenLine xmlns="" xmlns:a14="http://schemas.microsoft.com/office/drawing/2010/main" w="9525">
+              <a14:hiddenLine xmlns:a14="http://schemas.microsoft.com/office/drawing/2010/main" xmlns="" w="9525">
                 <a:solidFill>
                   <a:srgbClr val="000000"/>
                 </a:solidFill>
@@ -4654,14 +4654,14 @@
           </a:ln>
           <a:extLst>
             <a:ext uri="{909E8E84-426E-40dd-AFC4-6F175D3DCCD1}">
-              <a14:hiddenFill xmlns="" xmlns:a14="http://schemas.microsoft.com/office/drawing/2010/main">
+              <a14:hiddenFill xmlns:a14="http://schemas.microsoft.com/office/drawing/2010/main" xmlns="">
                 <a:solidFill>
                   <a:srgbClr val="FFFFFF"/>
                 </a:solidFill>
               </a14:hiddenFill>
             </a:ext>
             <a:ext uri="{91240B29-F687-4f45-9708-019B960494DF}">
-              <a14:hiddenLine xmlns="" xmlns:a14="http://schemas.microsoft.com/office/drawing/2010/main" w="9525">
+              <a14:hiddenLine xmlns:a14="http://schemas.microsoft.com/office/drawing/2010/main" xmlns="" w="9525">
                 <a:solidFill>
                   <a:srgbClr val="000000"/>
                 </a:solidFill>
@@ -4697,7 +4697,7 @@
           </a:ln>
           <a:extLst>
             <a:ext uri="{91240B29-F687-4f45-9708-019B960494DF}">
-              <a14:hiddenLine xmlns="" xmlns:a14="http://schemas.microsoft.com/office/drawing/2010/main" w="9525">
+              <a14:hiddenLine xmlns:a14="http://schemas.microsoft.com/office/drawing/2010/main" xmlns="" w="9525">
                 <a:solidFill>
                   <a:srgbClr val="000000"/>
                 </a:solidFill>
@@ -4750,7 +4750,7 @@
           </a:ln>
           <a:extLst>
             <a:ext uri="{91240B29-F687-4f45-9708-019B960494DF}">
-              <a14:hiddenLine xmlns="" xmlns:a14="http://schemas.microsoft.com/office/drawing/2010/main" w="9525">
+              <a14:hiddenLine xmlns:a14="http://schemas.microsoft.com/office/drawing/2010/main" xmlns="" w="9525">
                 <a:solidFill>
                   <a:srgbClr val="000000"/>
                 </a:solidFill>
@@ -4816,7 +4816,7 @@
           </a:ln>
           <a:extLst>
             <a:ext uri="{91240B29-F687-4f45-9708-019B960494DF}">
-              <a14:hiddenLine xmlns="" xmlns:a14="http://schemas.microsoft.com/office/drawing/2010/main" w="9525">
+              <a14:hiddenLine xmlns:a14="http://schemas.microsoft.com/office/drawing/2010/main" xmlns="" w="9525">
                 <a:solidFill>
                   <a:srgbClr val="000000"/>
                 </a:solidFill>
@@ -10543,10 +10543,10 @@
       </p:sp>
       <p:pic>
         <p:nvPicPr>
-          <p:cNvPr id="5" name="Picture 4">
+          <p:cNvPr id="2" name="Picture 1">
             <a:extLst>
               <a:ext uri="{FF2B5EF4-FFF2-40B4-BE49-F238E27FC236}">
-                <a16:creationId xmlns:a16="http://schemas.microsoft.com/office/drawing/2014/main" id="{36802F12-DA59-4FF8-B0CD-8B2370B8236F}"/>
+                <a16:creationId xmlns:a16="http://schemas.microsoft.com/office/drawing/2014/main" id="{D59FB03C-73F9-485B-94A8-F65E71FB2508}"/>
               </a:ext>
             </a:extLst>
           </p:cNvPr>
@@ -10563,8 +10563,8 @@
         </p:blipFill>
         <p:spPr>
           <a:xfrm>
-            <a:off x="7657330" y="18068215"/>
-            <a:ext cx="7628556" cy="4743450"/>
+            <a:off x="7887161" y="18086542"/>
+            <a:ext cx="7119490" cy="5218085"/>
           </a:xfrm>
           <a:prstGeom prst="rect">
             <a:avLst/>

</xml_diff>

<commit_message>
poster with pca results
</commit_message>
<xml_diff>
--- a/poster/Footprint.pptx
+++ b/poster/Footprint.pptx
@@ -238,7 +238,7 @@
           <a:p>
             <a:fld id="{5288C8A9-C8E4-D04E-9830-749FB15BD155}" type="datetimeFigureOut">
               <a:rPr lang="en-US" smtClean="0"/>
-              <a:t>12/7/18</a:t>
+              <a:t>12/8/18</a:t>
             </a:fld>
             <a:endParaRPr lang="en-US" dirty="0"/>
           </a:p>
@@ -4152,14 +4152,14 @@
           </a:ln>
           <a:extLst>
             <a:ext uri="{909E8E84-426E-40dd-AFC4-6F175D3DCCD1}">
-              <a14:hiddenFill xmlns="" xmlns:a14="http://schemas.microsoft.com/office/drawing/2010/main">
+              <a14:hiddenFill xmlns:a14="http://schemas.microsoft.com/office/drawing/2010/main" xmlns="">
                 <a:solidFill>
                   <a:srgbClr val="FFFFFF"/>
                 </a:solidFill>
               </a14:hiddenFill>
             </a:ext>
             <a:ext uri="{91240B29-F687-4f45-9708-019B960494DF}">
-              <a14:hiddenLine xmlns="" xmlns:a14="http://schemas.microsoft.com/office/drawing/2010/main" w="9525">
+              <a14:hiddenLine xmlns:a14="http://schemas.microsoft.com/office/drawing/2010/main" xmlns="" w="9525">
                 <a:solidFill>
                   <a:srgbClr val="000000"/>
                 </a:solidFill>
@@ -4313,14 +4313,14 @@
           </a:ln>
           <a:extLst>
             <a:ext uri="{909E8E84-426E-40dd-AFC4-6F175D3DCCD1}">
-              <a14:hiddenFill xmlns="" xmlns:a14="http://schemas.microsoft.com/office/drawing/2010/main">
+              <a14:hiddenFill xmlns:a14="http://schemas.microsoft.com/office/drawing/2010/main" xmlns="">
                 <a:solidFill>
                   <a:srgbClr val="FFFFFF"/>
                 </a:solidFill>
               </a14:hiddenFill>
             </a:ext>
             <a:ext uri="{91240B29-F687-4f45-9708-019B960494DF}">
-              <a14:hiddenLine xmlns="" xmlns:a14="http://schemas.microsoft.com/office/drawing/2010/main" w="9525">
+              <a14:hiddenLine xmlns:a14="http://schemas.microsoft.com/office/drawing/2010/main" xmlns="" w="9525">
                 <a:solidFill>
                   <a:srgbClr val="000000"/>
                 </a:solidFill>
@@ -4451,7 +4451,7 @@
                 <a:cs typeface="Calibri"/>
                 <a:sym typeface="Calibri"/>
               </a:rPr>
-              <a:t>Adj. Forensic Investigation via XYZ</a:t>
+              <a:t>Forensic Investigation via Robust Feature Extraction</a:t>
             </a:r>
           </a:p>
           <a:p>
@@ -4537,7 +4537,7 @@
         </p:blipFill>
         <p:spPr bwMode="auto">
           <a:xfrm>
-            <a:off x="7620000" y="35212219"/>
+            <a:off x="19454253" y="35245559"/>
             <a:ext cx="9914238" cy="1326198"/>
           </a:xfrm>
           <a:prstGeom prst="rect">
@@ -4549,14 +4549,14 @@
           </a:ln>
           <a:extLst>
             <a:ext uri="{909E8E84-426E-40dd-AFC4-6F175D3DCCD1}">
-              <a14:hiddenFill xmlns="" xmlns:a14="http://schemas.microsoft.com/office/drawing/2010/main">
+              <a14:hiddenFill xmlns:a14="http://schemas.microsoft.com/office/drawing/2010/main" xmlns="">
                 <a:solidFill>
                   <a:srgbClr val="FFFFFF"/>
                 </a:solidFill>
               </a14:hiddenFill>
             </a:ext>
             <a:ext uri="{91240B29-F687-4f45-9708-019B960494DF}">
-              <a14:hiddenLine xmlns="" xmlns:a14="http://schemas.microsoft.com/office/drawing/2010/main" w="9525">
+              <a14:hiddenLine xmlns:a14="http://schemas.microsoft.com/office/drawing/2010/main" xmlns="" w="9525">
                 <a:solidFill>
                   <a:srgbClr val="000000"/>
                 </a:solidFill>
@@ -4592,7 +4592,7 @@
           </a:ln>
           <a:extLst>
             <a:ext uri="{91240B29-F687-4f45-9708-019B960494DF}">
-              <a14:hiddenLine xmlns="" xmlns:a14="http://schemas.microsoft.com/office/drawing/2010/main" w="9525">
+              <a14:hiddenLine xmlns:a14="http://schemas.microsoft.com/office/drawing/2010/main" xmlns="" w="9525">
                 <a:solidFill>
                   <a:srgbClr val="000000"/>
                 </a:solidFill>
@@ -4616,7 +4616,7 @@
                 <a:latin typeface="Book Antiqua"/>
                 <a:cs typeface="Book Antiqua"/>
               </a:rPr>
-              <a:t>Our solution: Autoencoder and XYZ classifier </a:t>
+              <a:t>Our solution: Data augmentation and robust feature extraction</a:t>
             </a:r>
           </a:p>
         </p:txBody>
@@ -4645,7 +4645,7 @@
           </a:ln>
           <a:extLst>
             <a:ext uri="{91240B29-F687-4f45-9708-019B960494DF}">
-              <a14:hiddenLine xmlns="" xmlns:a14="http://schemas.microsoft.com/office/drawing/2010/main" w="9525">
+              <a14:hiddenLine xmlns:a14="http://schemas.microsoft.com/office/drawing/2010/main" xmlns="" w="9525">
                 <a:solidFill>
                   <a:srgbClr val="000000"/>
                 </a:solidFill>
@@ -4711,7 +4711,7 @@
           </a:ln>
           <a:extLst>
             <a:ext uri="{91240B29-F687-4f45-9708-019B960494DF}">
-              <a14:hiddenLine xmlns="" xmlns:a14="http://schemas.microsoft.com/office/drawing/2010/main" w="9525">
+              <a14:hiddenLine xmlns:a14="http://schemas.microsoft.com/office/drawing/2010/main" xmlns="" w="9525">
                 <a:solidFill>
                   <a:srgbClr val="000000"/>
                 </a:solidFill>
@@ -10965,7 +10965,7 @@
                 <a:latin typeface="+mn-lt"/>
                 <a:cs typeface="Big Caslon Medium" panose="02000603090000020003" pitchFamily="2" charset="-79"/>
               </a:rPr>
-              <a:t>11750</a:t>
+              <a:t>117500</a:t>
             </a:r>
           </a:p>
         </p:txBody>
@@ -11206,13 +11206,14 @@
           </p:cNvPr>
           <p:cNvCxnSpPr>
             <a:cxnSpLocks/>
+            <a:endCxn id="175" idx="3"/>
           </p:cNvCxnSpPr>
           <p:nvPr/>
         </p:nvCxnSpPr>
         <p:spPr bwMode="auto">
-          <a:xfrm>
-            <a:off x="6447886" y="30777040"/>
-            <a:ext cx="3226324" cy="0"/>
+          <a:xfrm flipV="1">
+            <a:off x="6447886" y="30761312"/>
+            <a:ext cx="3051247" cy="15728"/>
           </a:xfrm>
           <a:prstGeom prst="line">
             <a:avLst/>
@@ -11555,7 +11556,7 @@
         </p:nvSpPr>
         <p:spPr>
           <a:xfrm>
-            <a:off x="10038105" y="32039664"/>
+            <a:off x="9954522" y="32417512"/>
             <a:ext cx="7038078" cy="3320288"/>
           </a:xfrm>
           <a:prstGeom prst="rect">
@@ -11597,8 +11598,8 @@
               <a:buChar char="•"/>
             </a:pPr>
             <a:r>
-              <a:rPr lang="en-US" sz="3600" dirty="0"/>
-              <a:t>Low accuracy: </a:t>
+              <a:rPr lang="en-US" sz="3200" dirty="0"/>
+              <a:t>Low accuracy: &lt;0.1 (300 classes)</a:t>
             </a:r>
           </a:p>
           <a:p>
@@ -11613,8 +11614,8 @@
               <a:buChar char="•"/>
             </a:pPr>
             <a:r>
-              <a:rPr lang="en-US" sz="3600" dirty="0"/>
-              <a:t>Not robust</a:t>
+              <a:rPr lang="en-US" sz="3200" dirty="0"/>
+              <a:t>Possible reason: not robust</a:t>
             </a:r>
           </a:p>
           <a:p>
@@ -11629,7 +11630,7 @@
               <a:buChar char="o"/>
             </a:pPr>
             <a:r>
-              <a:rPr lang="en-US" sz="3200" dirty="0"/>
+              <a:rPr lang="en-US" sz="2800" dirty="0"/>
               <a:t>Requires centered footprints</a:t>
             </a:r>
           </a:p>
@@ -11645,7 +11646,7 @@
               <a:buChar char="o"/>
             </a:pPr>
             <a:r>
-              <a:rPr lang="en-US" sz="3200" dirty="0"/>
+              <a:rPr lang="en-US" sz="2800" dirty="0"/>
               <a:t>Requires same size</a:t>
             </a:r>
           </a:p>
@@ -11661,12 +11662,92 @@
               <a:buChar char="o"/>
             </a:pPr>
             <a:r>
-              <a:rPr lang="en-US" sz="3200" dirty="0"/>
+              <a:rPr lang="en-US" sz="2800" dirty="0"/>
               <a:t>Sensitive to angles</a:t>
             </a:r>
           </a:p>
           <a:p>
-            <a:pPr lvl="0">
+            <a:pPr marL="457200" indent="-457200">
+              <a:spcBef>
+                <a:spcPts val="0"/>
+              </a:spcBef>
+              <a:spcAft>
+                <a:spcPts val="0"/>
+              </a:spcAft>
+              <a:buFont typeface="Arial" panose="020B0604020202020204" pitchFamily="34" charset="0"/>
+              <a:buChar char="•"/>
+            </a:pPr>
+            <a:r>
+              <a:rPr lang="en-US" sz="3200" dirty="0"/>
+              <a:t>Cannot scale to 1175 classes</a:t>
+            </a:r>
+          </a:p>
+        </p:txBody>
+      </p:sp>
+      <p:pic>
+        <p:nvPicPr>
+          <p:cNvPr id="6" name="Picture 5">
+            <a:extLst>
+              <a:ext uri="{FF2B5EF4-FFF2-40B4-BE49-F238E27FC236}">
+                <a16:creationId xmlns:a16="http://schemas.microsoft.com/office/drawing/2014/main" id="{A0560B7D-FE96-BB4A-95DE-8368BD70EAD8}"/>
+              </a:ext>
+            </a:extLst>
+          </p:cNvPr>
+          <p:cNvPicPr>
+            <a:picLocks noChangeAspect="1"/>
+          </p:cNvPicPr>
+          <p:nvPr/>
+        </p:nvPicPr>
+        <p:blipFill>
+          <a:blip r:embed="rId11"/>
+          <a:stretch>
+            <a:fillRect/>
+          </a:stretch>
+        </p:blipFill>
+        <p:spPr>
+          <a:xfrm>
+            <a:off x="9616375" y="28538897"/>
+            <a:ext cx="7220146" cy="3693703"/>
+          </a:xfrm>
+          <a:prstGeom prst="rect">
+            <a:avLst/>
+          </a:prstGeom>
+        </p:spPr>
+      </p:pic>
+      <p:sp>
+        <p:nvSpPr>
+          <p:cNvPr id="197" name="Google Shape;50;p6">
+            <a:extLst>
+              <a:ext uri="{FF2B5EF4-FFF2-40B4-BE49-F238E27FC236}">
+                <a16:creationId xmlns:a16="http://schemas.microsoft.com/office/drawing/2014/main" id="{D0A8D1F8-6BE5-4744-A171-38B340FB1A91}"/>
+              </a:ext>
+            </a:extLst>
+          </p:cNvPr>
+          <p:cNvSpPr txBox="1"/>
+          <p:nvPr/>
+        </p:nvSpPr>
+        <p:spPr>
+          <a:xfrm>
+            <a:off x="15667345" y="30134248"/>
+            <a:ext cx="877138" cy="690649"/>
+          </a:xfrm>
+          <a:prstGeom prst="rect">
+            <a:avLst/>
+          </a:prstGeom>
+          <a:solidFill>
+            <a:schemeClr val="bg1"/>
+          </a:solidFill>
+          <a:ln>
+            <a:noFill/>
+          </a:ln>
+        </p:spPr>
+        <p:txBody>
+          <a:bodyPr spcFirstLastPara="1" wrap="square" lIns="91425" tIns="91425" rIns="91425" bIns="91425" anchor="t" anchorCtr="0">
+            <a:noAutofit/>
+          </a:bodyPr>
+          <a:lstStyle/>
+          <a:p>
+            <a:pPr lvl="0" algn="ctr">
               <a:spcBef>
                 <a:spcPts val="0"/>
               </a:spcBef>
@@ -11674,7 +11755,10 @@
                 <a:spcPts val="0"/>
               </a:spcAft>
             </a:pPr>
-            <a:endParaRPr lang="en-US" sz="3600" dirty="0"/>
+            <a:r>
+              <a:rPr lang="en-US" sz="3200" i="1" dirty="0"/>
+              <a:t>?</a:t>
+            </a:r>
           </a:p>
         </p:txBody>
       </p:sp>

</xml_diff>